<commit_message>
NXT added wordsearch starter
NXT added wordsearch starter
</commit_message>
<xml_diff>
--- a/15lego/CustomImagesSounds.pptx
+++ b/15lego/CustomImagesSounds.pptx
@@ -129,7 +129,7 @@
   </p:defaultTextStyle>
   <p:extLst>
     <p:ext uri="{EFAFB233-063F-42B5-8137-9DF3F51BA10A}">
-      <p15:sldGuideLst xmlns="" xmlns:p15="http://schemas.microsoft.com/office/powerpoint/2012/main">
+      <p15:sldGuideLst xmlns:p15="http://schemas.microsoft.com/office/powerpoint/2012/main">
         <p15:guide id="1" orient="horz" pos="2160">
           <p15:clr>
             <a:srgbClr val="A4A3A4"/>
@@ -229,7 +229,7 @@
             <a:fld id="{F8D9B3D7-15CB-9343-AA49-EFB5A8F33F18}" type="datetimeFigureOut">
               <a:rPr lang="en-US" smtClean="0"/>
               <a:pPr/>
-              <a:t>3/13/2019</a:t>
+              <a:t>3/15/2019</a:t>
             </a:fld>
             <a:endParaRPr lang="en-US"/>
           </a:p>
@@ -305,7 +305,7 @@
     </p:spTree>
     <p:extLst>
       <p:ext uri="{BB962C8B-B14F-4D97-AF65-F5344CB8AC3E}">
-        <p14:creationId xmlns="" xmlns:p14="http://schemas.microsoft.com/office/powerpoint/2010/main" val="3300303276"/>
+        <p14:creationId xmlns:p14="http://schemas.microsoft.com/office/powerpoint/2010/main" val="3300303276"/>
       </p:ext>
     </p:extLst>
   </p:cSld>
@@ -397,7 +397,7 @@
             <a:fld id="{FD3EFF1E-85A1-6640-AFB9-C38833E80A84}" type="datetimeFigureOut">
               <a:rPr lang="en-US" smtClean="0"/>
               <a:pPr/>
-              <a:t>3/13/2019</a:t>
+              <a:t>3/15/2019</a:t>
             </a:fld>
             <a:endParaRPr lang="en-US"/>
           </a:p>
@@ -566,7 +566,7 @@
     </p:spTree>
     <p:extLst>
       <p:ext uri="{BB962C8B-B14F-4D97-AF65-F5344CB8AC3E}">
-        <p14:creationId xmlns="" xmlns:p14="http://schemas.microsoft.com/office/powerpoint/2010/main" val="2489184269"/>
+        <p14:creationId xmlns:p14="http://schemas.microsoft.com/office/powerpoint/2010/main" val="2489184269"/>
       </p:ext>
     </p:extLst>
   </p:cSld>
@@ -742,7 +742,7 @@
     </p:spTree>
     <p:extLst>
       <p:ext uri="{BB962C8B-B14F-4D97-AF65-F5344CB8AC3E}">
-        <p14:creationId xmlns="" xmlns:p14="http://schemas.microsoft.com/office/powerpoint/2010/main" val="304404034"/>
+        <p14:creationId xmlns:p14="http://schemas.microsoft.com/office/powerpoint/2010/main" val="304404034"/>
       </p:ext>
     </p:extLst>
   </p:cSld>
@@ -827,7 +827,7 @@
     </p:spTree>
     <p:extLst>
       <p:ext uri="{BB962C8B-B14F-4D97-AF65-F5344CB8AC3E}">
-        <p14:creationId xmlns="" xmlns:p14="http://schemas.microsoft.com/office/powerpoint/2010/main" val="927186106"/>
+        <p14:creationId xmlns:p14="http://schemas.microsoft.com/office/powerpoint/2010/main" val="927186106"/>
       </p:ext>
     </p:extLst>
   </p:cSld>
@@ -912,7 +912,7 @@
     </p:spTree>
     <p:extLst>
       <p:ext uri="{BB962C8B-B14F-4D97-AF65-F5344CB8AC3E}">
-        <p14:creationId xmlns="" xmlns:p14="http://schemas.microsoft.com/office/powerpoint/2010/main" val="792719025"/>
+        <p14:creationId xmlns:p14="http://schemas.microsoft.com/office/powerpoint/2010/main" val="792719025"/>
       </p:ext>
     </p:extLst>
   </p:cSld>
@@ -1054,7 +1054,7 @@
             <a:fld id="{C5906764-F429-4C44-ADEB-B5A320935278}" type="datetime1">
               <a:rPr lang="en-US" smtClean="0"/>
               <a:pPr/>
-              <a:t>3/13/2019</a:t>
+              <a:t>3/15/2019</a:t>
             </a:fld>
             <a:endParaRPr lang="en-US"/>
           </a:p>
@@ -1110,7 +1110,7 @@
     </p:spTree>
     <p:extLst>
       <p:ext uri="{BB962C8B-B14F-4D97-AF65-F5344CB8AC3E}">
-        <p14:creationId xmlns="" xmlns:p14="http://schemas.microsoft.com/office/powerpoint/2010/main" val="1253788813"/>
+        <p14:creationId xmlns:p14="http://schemas.microsoft.com/office/powerpoint/2010/main" val="1253788813"/>
       </p:ext>
     </p:extLst>
   </p:cSld>
@@ -1230,7 +1230,7 @@
             <a:fld id="{4803ACA8-12DB-8B44-97BF-01F943EC24A2}" type="datetime1">
               <a:rPr lang="en-US" smtClean="0"/>
               <a:pPr/>
-              <a:t>3/13/2019</a:t>
+              <a:t>3/15/2019</a:t>
             </a:fld>
             <a:endParaRPr lang="en-US"/>
           </a:p>
@@ -1286,7 +1286,7 @@
     </p:spTree>
     <p:extLst>
       <p:ext uri="{BB962C8B-B14F-4D97-AF65-F5344CB8AC3E}">
-        <p14:creationId xmlns="" xmlns:p14="http://schemas.microsoft.com/office/powerpoint/2010/main" val="551884110"/>
+        <p14:creationId xmlns:p14="http://schemas.microsoft.com/office/powerpoint/2010/main" val="551884110"/>
       </p:ext>
     </p:extLst>
   </p:cSld>
@@ -1416,7 +1416,7 @@
             <a:fld id="{47416F98-2860-C14A-AF64-9DD6EA1C6F2B}" type="datetime1">
               <a:rPr lang="en-US" smtClean="0"/>
               <a:pPr/>
-              <a:t>3/13/2019</a:t>
+              <a:t>3/15/2019</a:t>
             </a:fld>
             <a:endParaRPr lang="en-US"/>
           </a:p>
@@ -1472,7 +1472,7 @@
     </p:spTree>
     <p:extLst>
       <p:ext uri="{BB962C8B-B14F-4D97-AF65-F5344CB8AC3E}">
-        <p14:creationId xmlns="" xmlns:p14="http://schemas.microsoft.com/office/powerpoint/2010/main" val="1425517541"/>
+        <p14:creationId xmlns:p14="http://schemas.microsoft.com/office/powerpoint/2010/main" val="1425517541"/>
       </p:ext>
     </p:extLst>
   </p:cSld>
@@ -1635,7 +1635,7 @@
             <a:fld id="{B7B15D7F-7ADA-2E40-9DD6-22F5B14DE3EC}" type="datetime1">
               <a:rPr lang="en-US" smtClean="0"/>
               <a:pPr/>
-              <a:t>3/13/2019</a:t>
+              <a:t>3/15/2019</a:t>
             </a:fld>
             <a:endParaRPr lang="en-US"/>
           </a:p>
@@ -1835,7 +1835,7 @@
           <a:blip r:embed="rId2">
             <a:extLst>
               <a:ext uri="{28A0092B-C50C-407E-A947-70E740481C1C}">
-                <a14:useLocalDpi xmlns="" xmlns:a14="http://schemas.microsoft.com/office/drawing/2010/main"/>
+                <a14:useLocalDpi xmlns:a14="http://schemas.microsoft.com/office/drawing/2010/main"/>
               </a:ext>
             </a:extLst>
           </a:blip>
@@ -1855,7 +1855,7 @@
           <a:noFill/>
           <a:extLst>
             <a:ext uri="{909E8E84-426E-40dd-AFC4-6F175D3DCCD1}">
-              <a14:hiddenFill xmlns="" xmlns:a14="http://schemas.microsoft.com/office/drawing/2010/main">
+              <a14:hiddenFill xmlns:a14="http://schemas.microsoft.com/office/drawing/2010/main" xmlns="">
                 <a:solidFill>
                   <a:srgbClr val="FFFFFF"/>
                 </a:solidFill>
@@ -2051,7 +2051,7 @@
     </p:spTree>
     <p:extLst>
       <p:ext uri="{BB962C8B-B14F-4D97-AF65-F5344CB8AC3E}">
-        <p14:creationId xmlns="" xmlns:p14="http://schemas.microsoft.com/office/powerpoint/2010/main" val="1528070401"/>
+        <p14:creationId xmlns:p14="http://schemas.microsoft.com/office/powerpoint/2010/main" val="1528070401"/>
       </p:ext>
     </p:extLst>
   </p:cSld>
@@ -2188,7 +2188,7 @@
             <a:fld id="{83F14012-E28D-9A48-BCC4-57A934C9C6E8}" type="datetime1">
               <a:rPr lang="en-US" smtClean="0"/>
               <a:pPr/>
-              <a:t>3/13/2019</a:t>
+              <a:t>3/15/2019</a:t>
             </a:fld>
             <a:endParaRPr lang="en-US"/>
           </a:p>
@@ -2252,7 +2252,7 @@
     </p:spTree>
     <p:extLst>
       <p:ext uri="{BB962C8B-B14F-4D97-AF65-F5344CB8AC3E}">
-        <p14:creationId xmlns="" xmlns:p14="http://schemas.microsoft.com/office/powerpoint/2010/main" val="522295134"/>
+        <p14:creationId xmlns:p14="http://schemas.microsoft.com/office/powerpoint/2010/main" val="522295134"/>
       </p:ext>
     </p:extLst>
   </p:cSld>
@@ -2463,7 +2463,7 @@
             <a:fld id="{243D60F1-77FD-D44D-9E5E-E014199770CF}" type="datetime1">
               <a:rPr lang="en-US" smtClean="0"/>
               <a:pPr/>
-              <a:t>3/13/2019</a:t>
+              <a:t>3/15/2019</a:t>
             </a:fld>
             <a:endParaRPr lang="en-US"/>
           </a:p>
@@ -2527,7 +2527,7 @@
     </p:spTree>
     <p:extLst>
       <p:ext uri="{BB962C8B-B14F-4D97-AF65-F5344CB8AC3E}">
-        <p14:creationId xmlns="" xmlns:p14="http://schemas.microsoft.com/office/powerpoint/2010/main" val="1448651849"/>
+        <p14:creationId xmlns:p14="http://schemas.microsoft.com/office/powerpoint/2010/main" val="1448651849"/>
       </p:ext>
     </p:extLst>
   </p:cSld>
@@ -2770,7 +2770,7 @@
             <a:fld id="{F5E885EC-A4C8-CF40-A44C-EFD9D1FFC1BF}" type="datetime1">
               <a:rPr lang="en-US" smtClean="0"/>
               <a:pPr/>
-              <a:t>3/13/2019</a:t>
+              <a:t>3/15/2019</a:t>
             </a:fld>
             <a:endParaRPr lang="en-US"/>
           </a:p>
@@ -2834,7 +2834,7 @@
     </p:spTree>
     <p:extLst>
       <p:ext uri="{BB962C8B-B14F-4D97-AF65-F5344CB8AC3E}">
-        <p14:creationId xmlns="" xmlns:p14="http://schemas.microsoft.com/office/powerpoint/2010/main" val="1469520104"/>
+        <p14:creationId xmlns:p14="http://schemas.microsoft.com/office/powerpoint/2010/main" val="1469520104"/>
       </p:ext>
     </p:extLst>
   </p:cSld>
@@ -3235,7 +3235,7 @@
             <a:fld id="{83FE5C94-0AE4-EC4D-849C-F3F15553512B}" type="datetime1">
               <a:rPr lang="en-US" smtClean="0"/>
               <a:pPr/>
-              <a:t>3/13/2019</a:t>
+              <a:t>3/15/2019</a:t>
             </a:fld>
             <a:endParaRPr lang="en-US"/>
           </a:p>
@@ -3299,7 +3299,7 @@
     </p:spTree>
     <p:extLst>
       <p:ext uri="{BB962C8B-B14F-4D97-AF65-F5344CB8AC3E}">
-        <p14:creationId xmlns="" xmlns:p14="http://schemas.microsoft.com/office/powerpoint/2010/main" val="14963781"/>
+        <p14:creationId xmlns:p14="http://schemas.microsoft.com/office/powerpoint/2010/main" val="14963781"/>
       </p:ext>
     </p:extLst>
   </p:cSld>
@@ -3374,7 +3374,7 @@
             <a:fld id="{CE10C574-2A10-7440-97F3-F98AF176B58D}" type="datetime1">
               <a:rPr lang="en-US" smtClean="0"/>
               <a:pPr/>
-              <a:t>3/13/2019</a:t>
+              <a:t>3/15/2019</a:t>
             </a:fld>
             <a:endParaRPr lang="en-US"/>
           </a:p>
@@ -3438,7 +3438,7 @@
     </p:spTree>
     <p:extLst>
       <p:ext uri="{BB962C8B-B14F-4D97-AF65-F5344CB8AC3E}">
-        <p14:creationId xmlns="" xmlns:p14="http://schemas.microsoft.com/office/powerpoint/2010/main" val="240680568"/>
+        <p14:creationId xmlns:p14="http://schemas.microsoft.com/office/powerpoint/2010/main" val="240680568"/>
       </p:ext>
     </p:extLst>
   </p:cSld>
@@ -3490,7 +3490,7 @@
             <a:fld id="{5D07429F-C207-3E4C-AB22-F6754E74C9A1}" type="datetime1">
               <a:rPr lang="en-US" smtClean="0"/>
               <a:pPr/>
-              <a:t>3/13/2019</a:t>
+              <a:t>3/15/2019</a:t>
             </a:fld>
             <a:endParaRPr lang="en-US"/>
           </a:p>
@@ -3554,7 +3554,7 @@
     </p:spTree>
     <p:extLst>
       <p:ext uri="{BB962C8B-B14F-4D97-AF65-F5344CB8AC3E}">
-        <p14:creationId xmlns="" xmlns:p14="http://schemas.microsoft.com/office/powerpoint/2010/main" val="1406599075"/>
+        <p14:creationId xmlns:p14="http://schemas.microsoft.com/office/powerpoint/2010/main" val="1406599075"/>
       </p:ext>
     </p:extLst>
   </p:cSld>
@@ -3751,7 +3751,7 @@
             <a:fld id="{8B30D5C9-295A-EA42-A1AB-104FF1EA1A60}" type="datetime1">
               <a:rPr lang="en-US" smtClean="0"/>
               <a:pPr/>
-              <a:t>3/13/2019</a:t>
+              <a:t>3/15/2019</a:t>
             </a:fld>
             <a:endParaRPr lang="en-US"/>
           </a:p>
@@ -3838,7 +3838,7 @@
     </p:spTree>
     <p:extLst>
       <p:ext uri="{BB962C8B-B14F-4D97-AF65-F5344CB8AC3E}">
-        <p14:creationId xmlns="" xmlns:p14="http://schemas.microsoft.com/office/powerpoint/2010/main" val="1210667349"/>
+        <p14:creationId xmlns:p14="http://schemas.microsoft.com/office/powerpoint/2010/main" val="1210667349"/>
       </p:ext>
     </p:extLst>
   </p:cSld>
@@ -3958,7 +3958,7 @@
             <a:fld id="{F72E9FFC-D20E-A049-80CF-66E6155070CC}" type="datetime1">
               <a:rPr lang="en-US" smtClean="0"/>
               <a:pPr/>
-              <a:t>3/13/2019</a:t>
+              <a:t>3/15/2019</a:t>
             </a:fld>
             <a:endParaRPr lang="en-US"/>
           </a:p>
@@ -4014,7 +4014,7 @@
     </p:spTree>
     <p:extLst>
       <p:ext uri="{BB962C8B-B14F-4D97-AF65-F5344CB8AC3E}">
-        <p14:creationId xmlns="" xmlns:p14="http://schemas.microsoft.com/office/powerpoint/2010/main" val="909324448"/>
+        <p14:creationId xmlns:p14="http://schemas.microsoft.com/office/powerpoint/2010/main" val="909324448"/>
       </p:ext>
     </p:extLst>
   </p:cSld>
@@ -4240,7 +4240,7 @@
             <a:fld id="{FB650C1D-DE7E-8942-81F9-ADF982A10F6E}" type="datetime1">
               <a:rPr lang="en-US" smtClean="0"/>
               <a:pPr/>
-              <a:t>3/13/2019</a:t>
+              <a:t>3/15/2019</a:t>
             </a:fld>
             <a:endParaRPr lang="en-US"/>
           </a:p>
@@ -4392,7 +4392,7 @@
     </p:spTree>
     <p:extLst>
       <p:ext uri="{BB962C8B-B14F-4D97-AF65-F5344CB8AC3E}">
-        <p14:creationId xmlns="" xmlns:p14="http://schemas.microsoft.com/office/powerpoint/2010/main" val="278579318"/>
+        <p14:creationId xmlns:p14="http://schemas.microsoft.com/office/powerpoint/2010/main" val="278579318"/>
       </p:ext>
     </p:extLst>
   </p:cSld>
@@ -4512,7 +4512,7 @@
             <a:fld id="{A170E993-A3B8-484D-A991-3B7C5ADDE57B}" type="datetime1">
               <a:rPr lang="en-US" smtClean="0"/>
               <a:pPr/>
-              <a:t>3/13/2019</a:t>
+              <a:t>3/15/2019</a:t>
             </a:fld>
             <a:endParaRPr lang="en-US"/>
           </a:p>
@@ -4576,7 +4576,7 @@
     </p:spTree>
     <p:extLst>
       <p:ext uri="{BB962C8B-B14F-4D97-AF65-F5344CB8AC3E}">
-        <p14:creationId xmlns="" xmlns:p14="http://schemas.microsoft.com/office/powerpoint/2010/main" val="568247166"/>
+        <p14:creationId xmlns:p14="http://schemas.microsoft.com/office/powerpoint/2010/main" val="568247166"/>
       </p:ext>
     </p:extLst>
   </p:cSld>
@@ -4706,7 +4706,7 @@
             <a:fld id="{DFB7D3BC-874D-914C-81FD-345F9972F84E}" type="datetime1">
               <a:rPr lang="en-US" smtClean="0"/>
               <a:pPr/>
-              <a:t>3/13/2019</a:t>
+              <a:t>3/15/2019</a:t>
             </a:fld>
             <a:endParaRPr lang="en-US"/>
           </a:p>
@@ -4770,7 +4770,7 @@
     </p:spTree>
     <p:extLst>
       <p:ext uri="{BB962C8B-B14F-4D97-AF65-F5344CB8AC3E}">
-        <p14:creationId xmlns="" xmlns:p14="http://schemas.microsoft.com/office/powerpoint/2010/main" val="670340753"/>
+        <p14:creationId xmlns:p14="http://schemas.microsoft.com/office/powerpoint/2010/main" val="670340753"/>
       </p:ext>
     </p:extLst>
   </p:cSld>
@@ -4912,7 +4912,7 @@
             <a:fld id="{C9C105DF-00F5-CE4B-8212-158B8730C78D}" type="datetime1">
               <a:rPr lang="en-US" smtClean="0"/>
               <a:pPr/>
-              <a:t>3/13/2019</a:t>
+              <a:t>3/15/2019</a:t>
             </a:fld>
             <a:endParaRPr lang="en-US"/>
           </a:p>
@@ -4968,7 +4968,7 @@
     </p:spTree>
     <p:extLst>
       <p:ext uri="{BB962C8B-B14F-4D97-AF65-F5344CB8AC3E}">
-        <p14:creationId xmlns="" xmlns:p14="http://schemas.microsoft.com/office/powerpoint/2010/main" val="2044070564"/>
+        <p14:creationId xmlns:p14="http://schemas.microsoft.com/office/powerpoint/2010/main" val="2044070564"/>
       </p:ext>
     </p:extLst>
   </p:cSld>
@@ -5088,7 +5088,7 @@
             <a:fld id="{2D816061-0097-DB4A-BADE-ABFE5479D517}" type="datetime1">
               <a:rPr lang="en-US" smtClean="0"/>
               <a:pPr/>
-              <a:t>3/13/2019</a:t>
+              <a:t>3/15/2019</a:t>
             </a:fld>
             <a:endParaRPr lang="en-US"/>
           </a:p>
@@ -5144,7 +5144,7 @@
     </p:spTree>
     <p:extLst>
       <p:ext uri="{BB962C8B-B14F-4D97-AF65-F5344CB8AC3E}">
-        <p14:creationId xmlns="" xmlns:p14="http://schemas.microsoft.com/office/powerpoint/2010/main" val="1398068089"/>
+        <p14:creationId xmlns:p14="http://schemas.microsoft.com/office/powerpoint/2010/main" val="1398068089"/>
       </p:ext>
     </p:extLst>
   </p:cSld>
@@ -5340,7 +5340,7 @@
             <a:fld id="{68186CD6-6D6F-9941-BF37-95C55A54112E}" type="datetime1">
               <a:rPr lang="en-US" smtClean="0"/>
               <a:pPr/>
-              <a:t>3/13/2019</a:t>
+              <a:t>3/15/2019</a:t>
             </a:fld>
             <a:endParaRPr lang="en-US"/>
           </a:p>
@@ -5396,7 +5396,7 @@
     </p:spTree>
     <p:extLst>
       <p:ext uri="{BB962C8B-B14F-4D97-AF65-F5344CB8AC3E}">
-        <p14:creationId xmlns="" xmlns:p14="http://schemas.microsoft.com/office/powerpoint/2010/main" val="1711789996"/>
+        <p14:creationId xmlns:p14="http://schemas.microsoft.com/office/powerpoint/2010/main" val="1711789996"/>
       </p:ext>
     </p:extLst>
   </p:cSld>
@@ -5578,7 +5578,7 @@
             <a:fld id="{A40C7E93-6B14-104A-80C2-8CA3B25F04C6}" type="datetime1">
               <a:rPr lang="en-US" smtClean="0"/>
               <a:pPr/>
-              <a:t>3/13/2019</a:t>
+              <a:t>3/15/2019</a:t>
             </a:fld>
             <a:endParaRPr lang="en-US"/>
           </a:p>
@@ -5634,7 +5634,7 @@
     </p:spTree>
     <p:extLst>
       <p:ext uri="{BB962C8B-B14F-4D97-AF65-F5344CB8AC3E}">
-        <p14:creationId xmlns="" xmlns:p14="http://schemas.microsoft.com/office/powerpoint/2010/main" val="216043913"/>
+        <p14:creationId xmlns:p14="http://schemas.microsoft.com/office/powerpoint/2010/main" val="216043913"/>
       </p:ext>
     </p:extLst>
   </p:cSld>
@@ -5951,7 +5951,7 @@
             <a:fld id="{7F4870F6-61A5-7548-80A6-6DE4C4A42405}" type="datetime1">
               <a:rPr lang="en-US" smtClean="0"/>
               <a:pPr/>
-              <a:t>3/13/2019</a:t>
+              <a:t>3/15/2019</a:t>
             </a:fld>
             <a:endParaRPr lang="en-US"/>
           </a:p>
@@ -6007,7 +6007,7 @@
     </p:spTree>
     <p:extLst>
       <p:ext uri="{BB962C8B-B14F-4D97-AF65-F5344CB8AC3E}">
-        <p14:creationId xmlns="" xmlns:p14="http://schemas.microsoft.com/office/powerpoint/2010/main" val="1802682361"/>
+        <p14:creationId xmlns:p14="http://schemas.microsoft.com/office/powerpoint/2010/main" val="1802682361"/>
       </p:ext>
     </p:extLst>
   </p:cSld>
@@ -6075,7 +6075,7 @@
             <a:fld id="{70EC6D47-FCDB-CF4E-8600-40B9B6E1AFD9}" type="datetime1">
               <a:rPr lang="en-US" smtClean="0"/>
               <a:pPr/>
-              <a:t>3/13/2019</a:t>
+              <a:t>3/15/2019</a:t>
             </a:fld>
             <a:endParaRPr lang="en-US"/>
           </a:p>
@@ -6131,7 +6131,7 @@
     </p:spTree>
     <p:extLst>
       <p:ext uri="{BB962C8B-B14F-4D97-AF65-F5344CB8AC3E}">
-        <p14:creationId xmlns="" xmlns:p14="http://schemas.microsoft.com/office/powerpoint/2010/main" val="983149451"/>
+        <p14:creationId xmlns:p14="http://schemas.microsoft.com/office/powerpoint/2010/main" val="983149451"/>
       </p:ext>
     </p:extLst>
   </p:cSld>
@@ -6176,7 +6176,7 @@
             <a:fld id="{4BD332A7-6911-3C47-9447-69E71075A29A}" type="datetime1">
               <a:rPr lang="en-US" smtClean="0"/>
               <a:pPr/>
-              <a:t>3/13/2019</a:t>
+              <a:t>3/15/2019</a:t>
             </a:fld>
             <a:endParaRPr lang="en-US"/>
           </a:p>
@@ -6232,7 +6232,7 @@
     </p:spTree>
     <p:extLst>
       <p:ext uri="{BB962C8B-B14F-4D97-AF65-F5344CB8AC3E}">
-        <p14:creationId xmlns="" xmlns:p14="http://schemas.microsoft.com/office/powerpoint/2010/main" val="1053642939"/>
+        <p14:creationId xmlns:p14="http://schemas.microsoft.com/office/powerpoint/2010/main" val="1053642939"/>
       </p:ext>
     </p:extLst>
   </p:cSld>
@@ -6428,7 +6428,7 @@
             <a:fld id="{AA8DEA82-4C6F-C54E-9349-1248281657E0}" type="datetime1">
               <a:rPr lang="en-US" smtClean="0"/>
               <a:pPr/>
-              <a:t>3/13/2019</a:t>
+              <a:t>3/15/2019</a:t>
             </a:fld>
             <a:endParaRPr lang="en-US"/>
           </a:p>
@@ -6484,7 +6484,7 @@
     </p:spTree>
     <p:extLst>
       <p:ext uri="{BB962C8B-B14F-4D97-AF65-F5344CB8AC3E}">
-        <p14:creationId xmlns="" xmlns:p14="http://schemas.microsoft.com/office/powerpoint/2010/main" val="2018590187"/>
+        <p14:creationId xmlns:p14="http://schemas.microsoft.com/office/powerpoint/2010/main" val="2018590187"/>
       </p:ext>
     </p:extLst>
   </p:cSld>
@@ -6711,7 +6711,7 @@
             <a:fld id="{1F94395E-AFA3-B24B-9321-99D4ECCE0398}" type="datetime1">
               <a:rPr lang="en-US" smtClean="0"/>
               <a:pPr/>
-              <a:t>3/13/2019</a:t>
+              <a:t>3/15/2019</a:t>
             </a:fld>
             <a:endParaRPr lang="en-US"/>
           </a:p>
@@ -6767,7 +6767,7 @@
     </p:spTree>
     <p:extLst>
       <p:ext uri="{BB962C8B-B14F-4D97-AF65-F5344CB8AC3E}">
-        <p14:creationId xmlns="" xmlns:p14="http://schemas.microsoft.com/office/powerpoint/2010/main" val="426722611"/>
+        <p14:creationId xmlns:p14="http://schemas.microsoft.com/office/powerpoint/2010/main" val="426722611"/>
       </p:ext>
     </p:extLst>
   </p:cSld>
@@ -6974,7 +6974,7 @@
             <a:fld id="{E3E0D2C9-5D41-E84B-A11A-6C09FA941CDA}" type="datetime1">
               <a:rPr lang="en-US" smtClean="0"/>
               <a:pPr/>
-              <a:t>3/13/2019</a:t>
+              <a:t>3/15/2019</a:t>
             </a:fld>
             <a:endParaRPr lang="en-US"/>
           </a:p>
@@ -7030,7 +7030,7 @@
     </p:spTree>
     <p:extLst>
       <p:ext uri="{BB962C8B-B14F-4D97-AF65-F5344CB8AC3E}">
-        <p14:creationId xmlns="" xmlns:p14="http://schemas.microsoft.com/office/powerpoint/2010/main" val="1479025744"/>
+        <p14:creationId xmlns:p14="http://schemas.microsoft.com/office/powerpoint/2010/main" val="1479025744"/>
       </p:ext>
     </p:extLst>
   </p:cSld>
@@ -7150,7 +7150,7 @@
             <a:fld id="{72770C3D-50D9-3C40-A1B5-4620EFB563FC}" type="datetime1">
               <a:rPr lang="en-US" smtClean="0"/>
               <a:pPr/>
-              <a:t>3/13/2019</a:t>
+              <a:t>3/15/2019</a:t>
             </a:fld>
             <a:endParaRPr lang="en-US"/>
           </a:p>
@@ -7206,7 +7206,7 @@
     </p:spTree>
     <p:extLst>
       <p:ext uri="{BB962C8B-B14F-4D97-AF65-F5344CB8AC3E}">
-        <p14:creationId xmlns="" xmlns:p14="http://schemas.microsoft.com/office/powerpoint/2010/main" val="862465383"/>
+        <p14:creationId xmlns:p14="http://schemas.microsoft.com/office/powerpoint/2010/main" val="862465383"/>
       </p:ext>
     </p:extLst>
   </p:cSld>
@@ -7336,7 +7336,7 @@
             <a:fld id="{C294F105-88F3-A848-A5B1-045E736560B5}" type="datetime1">
               <a:rPr lang="en-US" smtClean="0"/>
               <a:pPr/>
-              <a:t>3/13/2019</a:t>
+              <a:t>3/15/2019</a:t>
             </a:fld>
             <a:endParaRPr lang="en-US"/>
           </a:p>
@@ -7392,7 +7392,7 @@
     </p:spTree>
     <p:extLst>
       <p:ext uri="{BB962C8B-B14F-4D97-AF65-F5344CB8AC3E}">
-        <p14:creationId xmlns="" xmlns:p14="http://schemas.microsoft.com/office/powerpoint/2010/main" val="2088558478"/>
+        <p14:creationId xmlns:p14="http://schemas.microsoft.com/office/powerpoint/2010/main" val="2088558478"/>
       </p:ext>
     </p:extLst>
   </p:cSld>
@@ -7574,7 +7574,7 @@
             <a:fld id="{ACC0E1AD-E6D3-064E-A039-152874CF8A53}" type="datetime1">
               <a:rPr lang="en-US" smtClean="0"/>
               <a:pPr/>
-              <a:t>3/13/2019</a:t>
+              <a:t>3/15/2019</a:t>
             </a:fld>
             <a:endParaRPr lang="en-US"/>
           </a:p>
@@ -7630,7 +7630,7 @@
     </p:spTree>
     <p:extLst>
       <p:ext uri="{BB962C8B-B14F-4D97-AF65-F5344CB8AC3E}">
-        <p14:creationId xmlns="" xmlns:p14="http://schemas.microsoft.com/office/powerpoint/2010/main" val="3912280948"/>
+        <p14:creationId xmlns:p14="http://schemas.microsoft.com/office/powerpoint/2010/main" val="3912280948"/>
       </p:ext>
     </p:extLst>
   </p:cSld>
@@ -7947,7 +7947,7 @@
             <a:fld id="{C99FE2BB-52AC-034D-9826-2542204A9B05}" type="datetime1">
               <a:rPr lang="en-US" smtClean="0"/>
               <a:pPr/>
-              <a:t>3/13/2019</a:t>
+              <a:t>3/15/2019</a:t>
             </a:fld>
             <a:endParaRPr lang="en-US"/>
           </a:p>
@@ -8003,7 +8003,7 @@
     </p:spTree>
     <p:extLst>
       <p:ext uri="{BB962C8B-B14F-4D97-AF65-F5344CB8AC3E}">
-        <p14:creationId xmlns="" xmlns:p14="http://schemas.microsoft.com/office/powerpoint/2010/main" val="972148509"/>
+        <p14:creationId xmlns:p14="http://schemas.microsoft.com/office/powerpoint/2010/main" val="972148509"/>
       </p:ext>
     </p:extLst>
   </p:cSld>
@@ -8071,7 +8071,7 @@
             <a:fld id="{25FAC9C6-1209-EB4E-A016-113DABB47F9F}" type="datetime1">
               <a:rPr lang="en-US" smtClean="0"/>
               <a:pPr/>
-              <a:t>3/13/2019</a:t>
+              <a:t>3/15/2019</a:t>
             </a:fld>
             <a:endParaRPr lang="en-US"/>
           </a:p>
@@ -8127,7 +8127,7 @@
     </p:spTree>
     <p:extLst>
       <p:ext uri="{BB962C8B-B14F-4D97-AF65-F5344CB8AC3E}">
-        <p14:creationId xmlns="" xmlns:p14="http://schemas.microsoft.com/office/powerpoint/2010/main" val="3725393119"/>
+        <p14:creationId xmlns:p14="http://schemas.microsoft.com/office/powerpoint/2010/main" val="3725393119"/>
       </p:ext>
     </p:extLst>
   </p:cSld>
@@ -8172,7 +8172,7 @@
             <a:fld id="{28A59216-2276-7E45-854D-253E78414883}" type="datetime1">
               <a:rPr lang="en-US" smtClean="0"/>
               <a:pPr/>
-              <a:t>3/13/2019</a:t>
+              <a:t>3/15/2019</a:t>
             </a:fld>
             <a:endParaRPr lang="en-US"/>
           </a:p>
@@ -8228,7 +8228,7 @@
     </p:spTree>
     <p:extLst>
       <p:ext uri="{BB962C8B-B14F-4D97-AF65-F5344CB8AC3E}">
-        <p14:creationId xmlns="" xmlns:p14="http://schemas.microsoft.com/office/powerpoint/2010/main" val="4059073685"/>
+        <p14:creationId xmlns:p14="http://schemas.microsoft.com/office/powerpoint/2010/main" val="4059073685"/>
       </p:ext>
     </p:extLst>
   </p:cSld>
@@ -8455,7 +8455,7 @@
             <a:fld id="{88F58525-F76A-BF45-A828-F93739153269}" type="datetime1">
               <a:rPr lang="en-US" smtClean="0"/>
               <a:pPr/>
-              <a:t>3/13/2019</a:t>
+              <a:t>3/15/2019</a:t>
             </a:fld>
             <a:endParaRPr lang="en-US"/>
           </a:p>
@@ -8511,7 +8511,7 @@
     </p:spTree>
     <p:extLst>
       <p:ext uri="{BB962C8B-B14F-4D97-AF65-F5344CB8AC3E}">
-        <p14:creationId xmlns="" xmlns:p14="http://schemas.microsoft.com/office/powerpoint/2010/main" val="339650278"/>
+        <p14:creationId xmlns:p14="http://schemas.microsoft.com/office/powerpoint/2010/main" val="339650278"/>
       </p:ext>
     </p:extLst>
   </p:cSld>
@@ -8714,7 +8714,7 @@
             <a:fld id="{9479E451-AE2E-7741-AD76-2DB529CFFC3A}" type="datetime1">
               <a:rPr lang="en-US" smtClean="0"/>
               <a:pPr/>
-              <a:t>3/13/2019</a:t>
+              <a:t>3/15/2019</a:t>
             </a:fld>
             <a:endParaRPr lang="en-US"/>
           </a:p>
@@ -8770,7 +8770,7 @@
     </p:spTree>
     <p:extLst>
       <p:ext uri="{BB962C8B-B14F-4D97-AF65-F5344CB8AC3E}">
-        <p14:creationId xmlns="" xmlns:p14="http://schemas.microsoft.com/office/powerpoint/2010/main" val="261275509"/>
+        <p14:creationId xmlns:p14="http://schemas.microsoft.com/office/powerpoint/2010/main" val="261275509"/>
       </p:ext>
     </p:extLst>
   </p:cSld>
@@ -8933,7 +8933,7 @@
             <a:fld id="{A3931BFD-E9D8-F54D-B5D5-5ACD5AC0655E}" type="datetime1">
               <a:rPr lang="en-US" smtClean="0"/>
               <a:pPr/>
-              <a:t>3/13/2019</a:t>
+              <a:t>3/15/2019</a:t>
             </a:fld>
             <a:endParaRPr lang="en-US"/>
           </a:p>
@@ -9025,7 +9025,7 @@
     </p:spTree>
     <p:extLst>
       <p:ext uri="{BB962C8B-B14F-4D97-AF65-F5344CB8AC3E}">
-        <p14:creationId xmlns="" xmlns:p14="http://schemas.microsoft.com/office/powerpoint/2010/main" val="3556437462"/>
+        <p14:creationId xmlns:p14="http://schemas.microsoft.com/office/powerpoint/2010/main" val="3556437462"/>
       </p:ext>
     </p:extLst>
   </p:cSld>
@@ -9478,7 +9478,7 @@
             <a:fld id="{9AD50491-3720-C449-B098-8B506817FCDE}" type="datetime1">
               <a:rPr lang="en-US" smtClean="0"/>
               <a:pPr/>
-              <a:t>3/13/2019</a:t>
+              <a:t>3/15/2019</a:t>
             </a:fld>
             <a:endParaRPr lang="en-US"/>
           </a:p>
@@ -9786,7 +9786,7 @@
     </p:spTree>
     <p:extLst>
       <p:ext uri="{BB962C8B-B14F-4D97-AF65-F5344CB8AC3E}">
-        <p14:creationId xmlns="" xmlns:p14="http://schemas.microsoft.com/office/powerpoint/2010/main" val="902936129"/>
+        <p14:creationId xmlns:p14="http://schemas.microsoft.com/office/powerpoint/2010/main" val="902936129"/>
       </p:ext>
     </p:extLst>
   </p:cSld>
@@ -10245,7 +10245,7 @@
             <a:fld id="{BFC178B2-B4C5-964D-927E-48C3D45B987D}" type="datetime1">
               <a:rPr lang="en-US" smtClean="0"/>
               <a:pPr/>
-              <a:t>3/13/2019</a:t>
+              <a:t>3/15/2019</a:t>
             </a:fld>
             <a:endParaRPr lang="en-US"/>
           </a:p>
@@ -10337,7 +10337,7 @@
     </p:spTree>
     <p:extLst>
       <p:ext uri="{BB962C8B-B14F-4D97-AF65-F5344CB8AC3E}">
-        <p14:creationId xmlns="" xmlns:p14="http://schemas.microsoft.com/office/powerpoint/2010/main" val="717823509"/>
+        <p14:creationId xmlns:p14="http://schemas.microsoft.com/office/powerpoint/2010/main" val="717823509"/>
       </p:ext>
     </p:extLst>
   </p:cSld>
@@ -10715,7 +10715,7 @@
           <a:blip r:embed="rId3" cstate="print">
             <a:extLst>
               <a:ext uri="{28A0092B-C50C-407E-A947-70E740481C1C}">
-                <a14:useLocalDpi xmlns="" xmlns:a14="http://schemas.microsoft.com/office/drawing/2010/main"/>
+                <a14:useLocalDpi xmlns:a14="http://schemas.microsoft.com/office/drawing/2010/main"/>
               </a:ext>
             </a:extLst>
           </a:blip>
@@ -10735,7 +10735,7 @@
     </p:spTree>
     <p:extLst>
       <p:ext uri="{BB962C8B-B14F-4D97-AF65-F5344CB8AC3E}">
-        <p14:creationId xmlns="" xmlns:p14="http://schemas.microsoft.com/office/powerpoint/2010/main" val="1169267598"/>
+        <p14:creationId xmlns:p14="http://schemas.microsoft.com/office/powerpoint/2010/main" val="1169267598"/>
       </p:ext>
     </p:extLst>
   </p:cSld>
@@ -10879,7 +10879,7 @@
           <a:blip r:embed="rId2">
             <a:extLst>
               <a:ext uri="{28A0092B-C50C-407E-A947-70E740481C1C}">
-                <a14:useLocalDpi xmlns="" xmlns:a14="http://schemas.microsoft.com/office/drawing/2010/main"/>
+                <a14:useLocalDpi xmlns:a14="http://schemas.microsoft.com/office/drawing/2010/main"/>
               </a:ext>
             </a:extLst>
           </a:blip>
@@ -10933,7 +10933,7 @@
           <a:blip r:embed="rId4">
             <a:extLst>
               <a:ext uri="{28A0092B-C50C-407E-A947-70E740481C1C}">
-                <a14:useLocalDpi xmlns="" xmlns:a14="http://schemas.microsoft.com/office/drawing/2010/main"/>
+                <a14:useLocalDpi xmlns:a14="http://schemas.microsoft.com/office/drawing/2010/main"/>
               </a:ext>
             </a:extLst>
           </a:blip>
@@ -10954,7 +10954,7 @@
     </p:spTree>
     <p:extLst>
       <p:ext uri="{BB962C8B-B14F-4D97-AF65-F5344CB8AC3E}">
-        <p14:creationId xmlns="" xmlns:p14="http://schemas.microsoft.com/office/powerpoint/2010/main" val="2074854515"/>
+        <p14:creationId xmlns:p14="http://schemas.microsoft.com/office/powerpoint/2010/main" val="2074854515"/>
       </p:ext>
     </p:extLst>
   </p:cSld>
@@ -11015,12 +11015,14 @@
         </p:nvSpPr>
         <p:spPr>
           <a:xfrm>
-            <a:off x="457201" y="2133600"/>
-            <a:ext cx="3139440" cy="3992563"/>
-          </a:xfrm>
-        </p:spPr>
-        <p:txBody>
-          <a:bodyPr/>
+            <a:off x="261313" y="1274618"/>
+            <a:ext cx="3139440" cy="5466964"/>
+          </a:xfrm>
+        </p:spPr>
+        <p:txBody>
+          <a:bodyPr>
+            <a:normAutofit/>
+          </a:bodyPr>
           <a:lstStyle/>
           <a:p>
             <a:r>
@@ -11052,32 +11054,22 @@
           <a:p>
             <a:r>
               <a:rPr lang="en-GB" dirty="0" smtClean="0"/>
-              <a:t>After selecting the image press the preview button</a:t>
-            </a:r>
+              <a:t>After selecting the image press the preview </a:t>
+            </a:r>
+            <a:r>
+              <a:rPr lang="en-GB" dirty="0" smtClean="0"/>
+              <a:t>button</a:t>
+            </a:r>
+          </a:p>
+          <a:p>
             <a:endParaRPr lang="en-GB" dirty="0"/>
           </a:p>
-        </p:txBody>
-      </p:sp>
-      <p:sp>
-        <p:nvSpPr>
-          <p:cNvPr id="4" name="Footer Placeholder 3"/>
-          <p:cNvSpPr>
-            <a:spLocks noGrp="1"/>
-          </p:cNvSpPr>
-          <p:nvPr>
-            <p:ph type="ftr" sz="quarter" idx="11"/>
-          </p:nvPr>
-        </p:nvSpPr>
-        <p:spPr/>
-        <p:txBody>
-          <a:bodyPr/>
-          <a:lstStyle/>
-          <a:p>
-            <a:r>
-              <a:rPr lang="en-US" smtClean="0"/>
-              <a:t>Copyright © EV3Lessons.com 2016 (Last edit: 9/11/2016)</a:t>
-            </a:r>
-            <a:endParaRPr lang="en-US"/>
+          <a:p>
+            <a:r>
+              <a:rPr lang="en-GB" dirty="0" smtClean="0"/>
+              <a:t>Adjust x and y position so image in centre of preview</a:t>
+            </a:r>
+            <a:endParaRPr lang="en-GB" dirty="0"/>
           </a:p>
         </p:txBody>
       </p:sp>
@@ -11190,9 +11182,9 @@
           <p:nvPr/>
         </p:nvCxnSpPr>
         <p:spPr>
-          <a:xfrm rot="16200000" flipH="1">
-            <a:off x="2697512" y="3171747"/>
-            <a:ext cx="3045829" cy="1548987"/>
+          <a:xfrm>
+            <a:off x="3214255" y="1485652"/>
+            <a:ext cx="1780665" cy="3983504"/>
           </a:xfrm>
           <a:prstGeom prst="straightConnector1">
             <a:avLst/>
@@ -11275,8 +11267,8 @@
         </p:nvCxnSpPr>
         <p:spPr>
           <a:xfrm>
-            <a:off x="3445933" y="3268133"/>
-            <a:ext cx="2497254" cy="114611"/>
+            <a:off x="3214255" y="2374435"/>
+            <a:ext cx="2728932" cy="1008309"/>
           </a:xfrm>
           <a:prstGeom prst="straightConnector1">
             <a:avLst/>
@@ -11361,8 +11353,8 @@
         </p:nvCxnSpPr>
         <p:spPr>
           <a:xfrm flipV="1">
-            <a:off x="2905246" y="2335769"/>
-            <a:ext cx="3436288" cy="1842692"/>
+            <a:off x="2701636" y="2335769"/>
+            <a:ext cx="3639898" cy="932364"/>
           </a:xfrm>
           <a:prstGeom prst="straightConnector1">
             <a:avLst/>
@@ -11446,9 +11438,9 @@
           <p:nvPr/>
         </p:nvCxnSpPr>
         <p:spPr>
-          <a:xfrm rot="5400000" flipH="1" flipV="1">
-            <a:off x="2780670" y="3507321"/>
-            <a:ext cx="2086413" cy="1837261"/>
+          <a:xfrm flipV="1">
+            <a:off x="2905246" y="3382744"/>
+            <a:ext cx="1837261" cy="1007289"/>
           </a:xfrm>
           <a:prstGeom prst="straightConnector1">
             <a:avLst/>
@@ -11456,6 +11448,90 @@
           <a:ln w="38100">
             <a:solidFill>
               <a:srgbClr val="00B050"/>
+            </a:solidFill>
+            <a:tailEnd type="triangle"/>
+          </a:ln>
+        </p:spPr>
+        <p:style>
+          <a:lnRef idx="1">
+            <a:schemeClr val="accent1"/>
+          </a:lnRef>
+          <a:fillRef idx="0">
+            <a:schemeClr val="accent1"/>
+          </a:fillRef>
+          <a:effectRef idx="0">
+            <a:schemeClr val="accent1"/>
+          </a:effectRef>
+          <a:fontRef idx="minor">
+            <a:schemeClr val="tx1"/>
+          </a:fontRef>
+        </p:style>
+      </p:cxnSp>
+      <p:sp>
+        <p:nvSpPr>
+          <p:cNvPr id="19" name="Oval 18"/>
+          <p:cNvSpPr/>
+          <p:nvPr/>
+        </p:nvSpPr>
+        <p:spPr>
+          <a:xfrm>
+            <a:off x="5637877" y="3799141"/>
+            <a:ext cx="796280" cy="540038"/>
+          </a:xfrm>
+          <a:prstGeom prst="ellipse">
+            <a:avLst/>
+          </a:prstGeom>
+          <a:noFill/>
+          <a:ln w="38100">
+            <a:solidFill>
+              <a:srgbClr val="7030A0"/>
+            </a:solidFill>
+          </a:ln>
+        </p:spPr>
+        <p:style>
+          <a:lnRef idx="2">
+            <a:schemeClr val="accent1">
+              <a:shade val="50000"/>
+            </a:schemeClr>
+          </a:lnRef>
+          <a:fillRef idx="1">
+            <a:schemeClr val="accent1"/>
+          </a:fillRef>
+          <a:effectRef idx="0">
+            <a:schemeClr val="accent1"/>
+          </a:effectRef>
+          <a:fontRef idx="minor">
+            <a:schemeClr val="lt1"/>
+          </a:fontRef>
+        </p:style>
+        <p:txBody>
+          <a:bodyPr rtlCol="0" anchor="ctr"/>
+          <a:lstStyle/>
+          <a:p>
+            <a:pPr algn="ctr"/>
+            <a:endParaRPr lang="en-GB"/>
+          </a:p>
+        </p:txBody>
+      </p:sp>
+      <p:cxnSp>
+        <p:nvCxnSpPr>
+          <p:cNvPr id="20" name="Straight Arrow Connector 19"/>
+          <p:cNvCxnSpPr>
+            <a:endCxn id="19" idx="2"/>
+          </p:cNvCxnSpPr>
+          <p:nvPr/>
+        </p:nvCxnSpPr>
+        <p:spPr>
+          <a:xfrm flipV="1">
+            <a:off x="3147524" y="4069160"/>
+            <a:ext cx="2490353" cy="2140518"/>
+          </a:xfrm>
+          <a:prstGeom prst="straightConnector1">
+            <a:avLst/>
+          </a:prstGeom>
+          <a:ln w="38100">
+            <a:solidFill>
+              <a:srgbClr val="7030A0"/>
             </a:solidFill>
             <a:tailEnd type="triangle"/>
           </a:ln>
@@ -11478,7 +11554,7 @@
     </p:spTree>
     <p:extLst>
       <p:ext uri="{BB962C8B-B14F-4D97-AF65-F5344CB8AC3E}">
-        <p14:creationId xmlns="" xmlns:p14="http://schemas.microsoft.com/office/powerpoint/2010/main" val="174843332"/>
+        <p14:creationId xmlns:p14="http://schemas.microsoft.com/office/powerpoint/2010/main" val="174843332"/>
       </p:ext>
     </p:extLst>
   </p:cSld>
@@ -11517,7 +11593,7 @@
           <a:blip r:embed="rId3">
             <a:extLst>
               <a:ext uri="{28A0092B-C50C-407E-A947-70E740481C1C}">
-                <a14:useLocalDpi xmlns="" xmlns:a14="http://schemas.microsoft.com/office/drawing/2010/main"/>
+                <a14:useLocalDpi xmlns:a14="http://schemas.microsoft.com/office/drawing/2010/main"/>
               </a:ext>
             </a:extLst>
           </a:blip>
@@ -11892,7 +11968,7 @@
     </p:spTree>
     <p:extLst>
       <p:ext uri="{BB962C8B-B14F-4D97-AF65-F5344CB8AC3E}">
-        <p14:creationId xmlns="" xmlns:p14="http://schemas.microsoft.com/office/powerpoint/2010/main" val="629037147"/>
+        <p14:creationId xmlns:p14="http://schemas.microsoft.com/office/powerpoint/2010/main" val="629037147"/>
       </p:ext>
     </p:extLst>
   </p:cSld>
@@ -12044,7 +12120,7 @@
           <a:blip r:embed="rId2">
             <a:extLst>
               <a:ext uri="{28A0092B-C50C-407E-A947-70E740481C1C}">
-                <a14:useLocalDpi xmlns="" xmlns:a14="http://schemas.microsoft.com/office/drawing/2010/main"/>
+                <a14:useLocalDpi xmlns:a14="http://schemas.microsoft.com/office/drawing/2010/main"/>
               </a:ext>
             </a:extLst>
           </a:blip>
@@ -12074,7 +12150,7 @@
           <a:blip r:embed="rId3">
             <a:extLst>
               <a:ext uri="{28A0092B-C50C-407E-A947-70E740481C1C}">
-                <a14:useLocalDpi xmlns="" xmlns:a14="http://schemas.microsoft.com/office/drawing/2010/main"/>
+                <a14:useLocalDpi xmlns:a14="http://schemas.microsoft.com/office/drawing/2010/main"/>
               </a:ext>
             </a:extLst>
           </a:blip>
@@ -12104,7 +12180,7 @@
           <a:blip r:embed="rId4">
             <a:extLst>
               <a:ext uri="{28A0092B-C50C-407E-A947-70E740481C1C}">
-                <a14:useLocalDpi xmlns="" xmlns:a14="http://schemas.microsoft.com/office/drawing/2010/main"/>
+                <a14:useLocalDpi xmlns:a14="http://schemas.microsoft.com/office/drawing/2010/main"/>
               </a:ext>
             </a:extLst>
           </a:blip>
@@ -12125,7 +12201,7 @@
     </p:spTree>
     <p:extLst>
       <p:ext uri="{BB962C8B-B14F-4D97-AF65-F5344CB8AC3E}">
-        <p14:creationId xmlns="" xmlns:p14="http://schemas.microsoft.com/office/powerpoint/2010/main" val="994621121"/>
+        <p14:creationId xmlns:p14="http://schemas.microsoft.com/office/powerpoint/2010/main" val="994621121"/>
       </p:ext>
     </p:extLst>
   </p:cSld>
@@ -12285,7 +12361,7 @@
           <a:blip r:embed="rId3">
             <a:extLst>
               <a:ext uri="{28A0092B-C50C-407E-A947-70E740481C1C}">
-                <a14:useLocalDpi xmlns="" xmlns:a14="http://schemas.microsoft.com/office/drawing/2010/main"/>
+                <a14:useLocalDpi xmlns:a14="http://schemas.microsoft.com/office/drawing/2010/main"/>
               </a:ext>
             </a:extLst>
           </a:blip>
@@ -12315,7 +12391,7 @@
           <a:blip r:embed="rId4">
             <a:extLst>
               <a:ext uri="{28A0092B-C50C-407E-A947-70E740481C1C}">
-                <a14:useLocalDpi xmlns="" xmlns:a14="http://schemas.microsoft.com/office/drawing/2010/main"/>
+                <a14:useLocalDpi xmlns:a14="http://schemas.microsoft.com/office/drawing/2010/main"/>
               </a:ext>
             </a:extLst>
           </a:blip>
@@ -12382,7 +12458,7 @@
     </p:spTree>
     <p:extLst>
       <p:ext uri="{BB962C8B-B14F-4D97-AF65-F5344CB8AC3E}">
-        <p14:creationId xmlns="" xmlns:p14="http://schemas.microsoft.com/office/powerpoint/2010/main" val="1093098121"/>
+        <p14:creationId xmlns:p14="http://schemas.microsoft.com/office/powerpoint/2010/main" val="1093098121"/>
       </p:ext>
     </p:extLst>
   </p:cSld>
@@ -12421,7 +12497,7 @@
           <a:blip r:embed="rId2">
             <a:extLst>
               <a:ext uri="{28A0092B-C50C-407E-A947-70E740481C1C}">
-                <a14:useLocalDpi xmlns="" xmlns:a14="http://schemas.microsoft.com/office/drawing/2010/main"/>
+                <a14:useLocalDpi xmlns:a14="http://schemas.microsoft.com/office/drawing/2010/main"/>
               </a:ext>
             </a:extLst>
           </a:blip>
@@ -12564,7 +12640,7 @@
           <a:blip r:embed="rId3">
             <a:extLst>
               <a:ext uri="{28A0092B-C50C-407E-A947-70E740481C1C}">
-                <a14:useLocalDpi xmlns="" xmlns:a14="http://schemas.microsoft.com/office/drawing/2010/main"/>
+                <a14:useLocalDpi xmlns:a14="http://schemas.microsoft.com/office/drawing/2010/main"/>
               </a:ext>
             </a:extLst>
           </a:blip>
@@ -12631,7 +12707,7 @@
     </p:spTree>
     <p:extLst>
       <p:ext uri="{BB962C8B-B14F-4D97-AF65-F5344CB8AC3E}">
-        <p14:creationId xmlns="" xmlns:p14="http://schemas.microsoft.com/office/powerpoint/2010/main" val="34995183"/>
+        <p14:creationId xmlns:p14="http://schemas.microsoft.com/office/powerpoint/2010/main" val="34995183"/>
       </p:ext>
     </p:extLst>
   </p:cSld>
@@ -12818,7 +12894,7 @@
           <a:effectLst/>
           <a:extLst>
             <a:ext uri="{91240B29-F687-4f45-9708-019B960494DF}">
-              <a14:hiddenLine xmlns="" xmlns:a14="http://schemas.microsoft.com/office/drawing/2010/main" w="9525">
+              <a14:hiddenLine xmlns:a14="http://schemas.microsoft.com/office/drawing/2010/main" xmlns="" w="9525">
                 <a:solidFill>
                   <a:schemeClr val="tx1"/>
                 </a:solidFill>
@@ -12828,7 +12904,7 @@
               </a14:hiddenLine>
             </a:ext>
             <a:ext uri="{AF507438-7753-43e0-B8FC-AC1667EBCBE1}">
-              <a14:hiddenEffects xmlns="" xmlns:a14="http://schemas.microsoft.com/office/drawing/2010/main">
+              <a14:hiddenEffects xmlns:a14="http://schemas.microsoft.com/office/drawing/2010/main" xmlns="">
                 <a:effectLst>
                   <a:outerShdw dist="35921" dir="2700000" algn="ctr" rotWithShape="0">
                     <a:schemeClr val="bg2"/>
@@ -13161,7 +13237,7 @@
           <a:blip r:embed="rId3">
             <a:extLst>
               <a:ext uri="{28A0092B-C50C-407E-A947-70E740481C1C}">
-                <a14:useLocalDpi xmlns="" xmlns:a14="http://schemas.microsoft.com/office/drawing/2010/main"/>
+                <a14:useLocalDpi xmlns:a14="http://schemas.microsoft.com/office/drawing/2010/main"/>
               </a:ext>
             </a:extLst>
           </a:blip>
@@ -13181,7 +13257,7 @@
           <a:noFill/>
           <a:extLst>
             <a:ext uri="{909E8E84-426E-40dd-AFC4-6F175D3DCCD1}">
-              <a14:hiddenFill xmlns="" xmlns:a14="http://schemas.microsoft.com/office/drawing/2010/main">
+              <a14:hiddenFill xmlns:a14="http://schemas.microsoft.com/office/drawing/2010/main" xmlns="">
                 <a:solidFill>
                   <a:srgbClr val="FFFFFF"/>
                 </a:solidFill>
@@ -13193,7 +13269,7 @@
     </p:spTree>
     <p:extLst>
       <p:ext uri="{BB962C8B-B14F-4D97-AF65-F5344CB8AC3E}">
-        <p14:creationId xmlns="" xmlns:p14="http://schemas.microsoft.com/office/powerpoint/2010/main" val="2543612530"/>
+        <p14:creationId xmlns:p14="http://schemas.microsoft.com/office/powerpoint/2010/main" val="2543612530"/>
       </p:ext>
     </p:extLst>
   </p:cSld>
@@ -13326,7 +13402,7 @@
     </p:spTree>
     <p:extLst>
       <p:ext uri="{BB962C8B-B14F-4D97-AF65-F5344CB8AC3E}">
-        <p14:creationId xmlns="" xmlns:p14="http://schemas.microsoft.com/office/powerpoint/2010/main" val="864516167"/>
+        <p14:creationId xmlns:p14="http://schemas.microsoft.com/office/powerpoint/2010/main" val="864516167"/>
       </p:ext>
     </p:extLst>
   </p:cSld>
@@ -13539,7 +13615,7 @@
     </p:spTree>
     <p:extLst>
       <p:ext uri="{BB962C8B-B14F-4D97-AF65-F5344CB8AC3E}">
-        <p14:creationId xmlns="" xmlns:p14="http://schemas.microsoft.com/office/powerpoint/2010/main" val="1702464381"/>
+        <p14:creationId xmlns:p14="http://schemas.microsoft.com/office/powerpoint/2010/main" val="1702464381"/>
       </p:ext>
     </p:extLst>
   </p:cSld>
@@ -13758,7 +13834,7 @@
           <a:blip r:embed="rId2">
             <a:extLst>
               <a:ext uri="{28A0092B-C50C-407E-A947-70E740481C1C}">
-                <a14:useLocalDpi xmlns="" xmlns:a14="http://schemas.microsoft.com/office/drawing/2010/main"/>
+                <a14:useLocalDpi xmlns:a14="http://schemas.microsoft.com/office/drawing/2010/main"/>
               </a:ext>
             </a:extLst>
           </a:blip>
@@ -13788,7 +13864,7 @@
           <a:blip r:embed="rId3" cstate="print">
             <a:extLst>
               <a:ext uri="{28A0092B-C50C-407E-A947-70E740481C1C}">
-                <a14:useLocalDpi xmlns="" xmlns:a14="http://schemas.microsoft.com/office/drawing/2010/main"/>
+                <a14:useLocalDpi xmlns:a14="http://schemas.microsoft.com/office/drawing/2010/main"/>
               </a:ext>
             </a:extLst>
           </a:blip>
@@ -13855,7 +13931,7 @@
     </p:spTree>
     <p:extLst>
       <p:ext uri="{BB962C8B-B14F-4D97-AF65-F5344CB8AC3E}">
-        <p14:creationId xmlns="" xmlns:p14="http://schemas.microsoft.com/office/powerpoint/2010/main" val="145858858"/>
+        <p14:creationId xmlns:p14="http://schemas.microsoft.com/office/powerpoint/2010/main" val="145858858"/>
       </p:ext>
     </p:extLst>
   </p:cSld>
@@ -14012,7 +14088,7 @@
           <a:blip r:embed="rId2" cstate="print">
             <a:extLst>
               <a:ext uri="{28A0092B-C50C-407E-A947-70E740481C1C}">
-                <a14:useLocalDpi xmlns="" xmlns:a14="http://schemas.microsoft.com/office/drawing/2010/main"/>
+                <a14:useLocalDpi xmlns:a14="http://schemas.microsoft.com/office/drawing/2010/main"/>
               </a:ext>
             </a:extLst>
           </a:blip>
@@ -14088,7 +14164,7 @@
           <a:blip r:embed="rId3" cstate="print">
             <a:extLst>
               <a:ext uri="{28A0092B-C50C-407E-A947-70E740481C1C}">
-                <a14:useLocalDpi xmlns="" xmlns:a14="http://schemas.microsoft.com/office/drawing/2010/main"/>
+                <a14:useLocalDpi xmlns:a14="http://schemas.microsoft.com/office/drawing/2010/main"/>
               </a:ext>
             </a:extLst>
           </a:blip>
@@ -14133,7 +14209,7 @@
     </p:spTree>
     <p:extLst>
       <p:ext uri="{BB962C8B-B14F-4D97-AF65-F5344CB8AC3E}">
-        <p14:creationId xmlns="" xmlns:p14="http://schemas.microsoft.com/office/powerpoint/2010/main" val="1739040089"/>
+        <p14:creationId xmlns:p14="http://schemas.microsoft.com/office/powerpoint/2010/main" val="1739040089"/>
       </p:ext>
     </p:extLst>
   </p:cSld>
@@ -14479,7 +14555,7 @@
     </p:spTree>
     <p:extLst>
       <p:ext uri="{BB962C8B-B14F-4D97-AF65-F5344CB8AC3E}">
-        <p14:creationId xmlns="" xmlns:p14="http://schemas.microsoft.com/office/powerpoint/2010/main" val="3015073695"/>
+        <p14:creationId xmlns:p14="http://schemas.microsoft.com/office/powerpoint/2010/main" val="3015073695"/>
       </p:ext>
     </p:extLst>
   </p:cSld>
@@ -14645,7 +14721,7 @@
           <a:blip r:embed="rId2" cstate="print">
             <a:extLst>
               <a:ext uri="{28A0092B-C50C-407E-A947-70E740481C1C}">
-                <a14:useLocalDpi xmlns="" xmlns:a14="http://schemas.microsoft.com/office/drawing/2010/main"/>
+                <a14:useLocalDpi xmlns:a14="http://schemas.microsoft.com/office/drawing/2010/main"/>
               </a:ext>
             </a:extLst>
           </a:blip>
@@ -14699,7 +14775,7 @@
           <a:blip r:embed="rId4">
             <a:extLst>
               <a:ext uri="{28A0092B-C50C-407E-A947-70E740481C1C}">
-                <a14:useLocalDpi xmlns="" xmlns:a14="http://schemas.microsoft.com/office/drawing/2010/main"/>
+                <a14:useLocalDpi xmlns:a14="http://schemas.microsoft.com/office/drawing/2010/main"/>
               </a:ext>
             </a:extLst>
           </a:blip>
@@ -14729,7 +14805,7 @@
           <a:blip r:embed="rId5">
             <a:extLst>
               <a:ext uri="{28A0092B-C50C-407E-A947-70E740481C1C}">
-                <a14:useLocalDpi xmlns="" xmlns:a14="http://schemas.microsoft.com/office/drawing/2010/main"/>
+                <a14:useLocalDpi xmlns:a14="http://schemas.microsoft.com/office/drawing/2010/main"/>
               </a:ext>
             </a:extLst>
           </a:blip>
@@ -14750,7 +14826,7 @@
     </p:spTree>
     <p:extLst>
       <p:ext uri="{BB962C8B-B14F-4D97-AF65-F5344CB8AC3E}">
-        <p14:creationId xmlns="" xmlns:p14="http://schemas.microsoft.com/office/powerpoint/2010/main" val="493547866"/>
+        <p14:creationId xmlns:p14="http://schemas.microsoft.com/office/powerpoint/2010/main" val="493547866"/>
       </p:ext>
     </p:extLst>
   </p:cSld>
@@ -15089,7 +15165,7 @@
     </p:spTree>
     <p:extLst>
       <p:ext uri="{BB962C8B-B14F-4D97-AF65-F5344CB8AC3E}">
-        <p14:creationId xmlns="" xmlns:p14="http://schemas.microsoft.com/office/powerpoint/2010/main" val="3595856800"/>
+        <p14:creationId xmlns:p14="http://schemas.microsoft.com/office/powerpoint/2010/main" val="3595856800"/>
       </p:ext>
     </p:extLst>
   </p:cSld>
@@ -15431,7 +15507,7 @@
     </p:spTree>
     <p:extLst>
       <p:ext uri="{BB962C8B-B14F-4D97-AF65-F5344CB8AC3E}">
-        <p14:creationId xmlns="" xmlns:p14="http://schemas.microsoft.com/office/powerpoint/2010/main" val="906178164"/>
+        <p14:creationId xmlns:p14="http://schemas.microsoft.com/office/powerpoint/2010/main" val="906178164"/>
       </p:ext>
     </p:extLst>
   </p:cSld>
@@ -15696,7 +15772,7 @@
   <a:extraClrSchemeLst/>
   <a:extLst>
     <a:ext uri="{05A4C25C-085E-4340-85A3-A5531E510DB2}">
-      <thm15:themeFamily xmlns="" xmlns:thm15="http://schemas.microsoft.com/office/thememl/2012/main" name="Office Theme" id="{62F939B6-93AF-4DB8-9C6B-D6C7DFDC589F}" vid="{4A3C46E8-61CC-4603-A589-7422A47A8E4A}"/>
+      <thm15:themeFamily xmlns:thm15="http://schemas.microsoft.com/office/thememl/2012/main" name="Office Theme" id="{62F939B6-93AF-4DB8-9C6B-D6C7DFDC589F}" vid="{4A3C46E8-61CC-4603-A589-7422A47A8E4A}"/>
     </a:ext>
   </a:extLst>
 </a:theme>
@@ -15954,7 +16030,7 @@
   <a:extraClrSchemeLst/>
   <a:extLst>
     <a:ext uri="{05A4C25C-085E-4340-85A3-A5531E510DB2}">
-      <thm15:themeFamily xmlns="" xmlns:thm15="http://schemas.microsoft.com/office/thememl/2012/main" name="beginner" id="{AEF29D72-34CC-C448-A679-08550D2D21D1}" vid="{04B54D62-7BE5-DF47-9F85-5B9FEF4E3E09}"/>
+      <thm15:themeFamily xmlns:thm15="http://schemas.microsoft.com/office/thememl/2012/main" name="beginner" id="{AEF29D72-34CC-C448-A679-08550D2D21D1}" vid="{04B54D62-7BE5-DF47-9F85-5B9FEF4E3E09}"/>
     </a:ext>
   </a:extLst>
 </a:theme>
@@ -16215,7 +16291,7 @@
   <a:extraClrSchemeLst/>
   <a:extLst>
     <a:ext uri="{05A4C25C-085E-4340-85A3-A5531E510DB2}">
-      <thm15:themeFamily xmlns="" xmlns:thm15="http://schemas.microsoft.com/office/thememl/2012/main" name="Office Theme" id="{62F939B6-93AF-4DB8-9C6B-D6C7DFDC589F}" vid="{4A3C46E8-61CC-4603-A589-7422A47A8E4A}"/>
+      <thm15:themeFamily xmlns:thm15="http://schemas.microsoft.com/office/thememl/2012/main" name="Office Theme" id="{62F939B6-93AF-4DB8-9C6B-D6C7DFDC589F}" vid="{4A3C46E8-61CC-4603-A589-7422A47A8E4A}"/>
     </a:ext>
   </a:extLst>
 </a:theme>

</xml_diff>